<commit_message>
new images to include IUA change
</commit_message>
<xml_diff>
--- a/input/images-source/Diagrams.pptx
+++ b/input/images-source/Diagrams.pptx
@@ -5564,7 +5564,7 @@
                   </a:schemeClr>
                 </a:solidFill>
               </a:rPr>
-              <a:t>PMIR Patient Identity Manager</a:t>
+              <a:t>PMIR Patient Identity Registry</a:t>
             </a:r>
           </a:p>
         </p:txBody>
@@ -6106,8 +6106,8 @@
         </p:nvSpPr>
         <p:spPr>
           <a:xfrm>
-            <a:off x="2490978" y="4775483"/>
-            <a:ext cx="1284597" cy="461665"/>
+            <a:off x="2105079" y="4893120"/>
+            <a:ext cx="2234297" cy="276999"/>
           </a:xfrm>
           <a:prstGeom prst="rect">
             <a:avLst/>
@@ -6130,13 +6130,7 @@
           <a:p>
             <a:r>
               <a:rPr lang="en-US" sz="1200" i="1" dirty="0"/>
-              <a:t>Patient Discovery </a:t>
-            </a:r>
-          </a:p>
-          <a:p>
-            <a:r>
-              <a:rPr lang="en-US" sz="1200" i="1" dirty="0"/>
-              <a:t>Process Flow</a:t>
+              <a:t>Patient Discovery Process Flow</a:t>
             </a:r>
           </a:p>
         </p:txBody>
@@ -6794,9 +6788,9 @@
         <p:grpSpPr>
           <a:xfrm>
             <a:off x="545123" y="1107174"/>
-            <a:ext cx="3134231" cy="3520318"/>
+            <a:ext cx="3122270" cy="3520318"/>
             <a:chOff x="493249" y="1193092"/>
-            <a:chExt cx="2752223" cy="3109160"/>
+            <a:chExt cx="2741720" cy="3109160"/>
           </a:xfrm>
           <a:solidFill>
             <a:srgbClr val="E2F0D9"/>
@@ -6817,9 +6811,9 @@
           <p:grpSpPr>
             <a:xfrm>
               <a:off x="493249" y="1193092"/>
-              <a:ext cx="2752223" cy="3109160"/>
+              <a:ext cx="2741720" cy="3109160"/>
               <a:chOff x="480128" y="540384"/>
-              <a:chExt cx="2752223" cy="2315256"/>
+              <a:chExt cx="2741720" cy="2315256"/>
             </a:xfrm>
             <a:grpFill/>
           </p:grpSpPr>
@@ -6841,7 +6835,9 @@
                 <a:ext cx="2741720" cy="2315256"/>
               </a:xfrm>
               <a:prstGeom prst="roundRect">
-                <a:avLst/>
+                <a:avLst>
+                  <a:gd name="adj" fmla="val 16667"/>
+                </a:avLst>
               </a:prstGeom>
               <a:grpFill/>
               <a:ln>
@@ -6892,8 +6888,8 @@
             </p:nvSpPr>
             <p:spPr>
               <a:xfrm>
-                <a:off x="490631" y="586784"/>
-                <a:ext cx="2741720" cy="425081"/>
+                <a:off x="714269" y="586784"/>
+                <a:ext cx="2271367" cy="425081"/>
               </a:xfrm>
               <a:prstGeom prst="rect">
                 <a:avLst/>
@@ -8842,13 +8838,8 @@
           <a:p>
             <a:r>
               <a:rPr lang="en-US" sz="1400" dirty="0"/>
-              <a:t>PMIR Patient Identity </a:t>
-            </a:r>
-            <a:r>
-              <a:rPr lang="en-US" sz="1400" dirty="0" err="1"/>
-              <a:t>Mgr</a:t>
-            </a:r>
-            <a:endParaRPr lang="en-US" sz="1400" dirty="0"/>
+              <a:t>PMIR Patient Id Registry</a:t>
+            </a:r>
           </a:p>
         </p:txBody>
       </p:sp>
@@ -9388,8 +9379,8 @@
           <p:nvPr/>
         </p:nvSpPr>
         <p:spPr>
-          <a:xfrm>
-            <a:off x="5670563" y="833725"/>
+          <a:xfrm rot="732098">
+            <a:off x="5590592" y="1085328"/>
             <a:ext cx="2609777" cy="276999"/>
           </a:xfrm>
           <a:prstGeom prst="rect">
@@ -10459,7 +10450,7 @@
           <p:nvPr/>
         </p:nvSpPr>
         <p:spPr>
-          <a:xfrm>
+          <a:xfrm rot="21016646">
             <a:off x="4011035" y="2680394"/>
             <a:ext cx="2066523" cy="276999"/>
           </a:xfrm>
@@ -10497,7 +10488,7 @@
         </p:nvCxnSpPr>
         <p:spPr>
           <a:xfrm>
-            <a:off x="2931287" y="865959"/>
+            <a:off x="2922194" y="922012"/>
             <a:ext cx="705843" cy="13688"/>
           </a:xfrm>
           <a:prstGeom prst="straightConnector1">
@@ -10538,9 +10529,9 @@
           <p:nvPr/>
         </p:nvSpPr>
         <p:spPr>
-          <a:xfrm>
-            <a:off x="3563132" y="764279"/>
-            <a:ext cx="2066523" cy="461665"/>
+          <a:xfrm rot="522120">
+            <a:off x="3530651" y="977235"/>
+            <a:ext cx="2066523" cy="276999"/>
           </a:xfrm>
           <a:prstGeom prst="rect">
             <a:avLst/>
@@ -10555,13 +10546,7 @@
           <a:p>
             <a:r>
               <a:rPr lang="en-US" sz="1200" dirty="0"/>
-              <a:t>[ITI-71]</a:t>
-            </a:r>
-          </a:p>
-          <a:p>
-            <a:r>
-              <a:rPr lang="en-US" sz="1200" dirty="0"/>
-              <a:t> [ITI-72]</a:t>
+              <a:t>[ITI-103, [ITI-71],  [ITI-72]</a:t>
             </a:r>
           </a:p>
         </p:txBody>
@@ -10623,8 +10608,8 @@
           <p:nvPr/>
         </p:nvSpPr>
         <p:spPr>
-          <a:xfrm>
-            <a:off x="3637130" y="1922758"/>
+          <a:xfrm rot="401426">
+            <a:off x="3605998" y="1970307"/>
             <a:ext cx="2066523" cy="276999"/>
           </a:xfrm>
           <a:prstGeom prst="rect">
@@ -10702,8 +10687,8 @@
           <p:nvPr/>
         </p:nvSpPr>
         <p:spPr>
-          <a:xfrm>
-            <a:off x="3611582" y="1132266"/>
+          <a:xfrm rot="478807">
+            <a:off x="3582089" y="1262568"/>
             <a:ext cx="2066523" cy="276999"/>
           </a:xfrm>
           <a:prstGeom prst="rect">
@@ -10781,8 +10766,8 @@
           <p:nvPr/>
         </p:nvSpPr>
         <p:spPr>
-          <a:xfrm>
-            <a:off x="3622433" y="1371905"/>
+          <a:xfrm rot="299284">
+            <a:off x="3576156" y="1455779"/>
             <a:ext cx="2066523" cy="276999"/>
           </a:xfrm>
           <a:prstGeom prst="rect">
@@ -10860,8 +10845,8 @@
           <p:nvPr/>
         </p:nvSpPr>
         <p:spPr>
-          <a:xfrm>
-            <a:off x="3631711" y="2170038"/>
+          <a:xfrm rot="473866">
+            <a:off x="3549949" y="2281276"/>
             <a:ext cx="2066523" cy="276999"/>
           </a:xfrm>
           <a:prstGeom prst="rect">
@@ -10943,9 +10928,9 @@
           <p:nvPr/>
         </p:nvCxnSpPr>
         <p:spPr>
-          <a:xfrm>
-            <a:off x="2929142" y="1716067"/>
-            <a:ext cx="717809" cy="22373"/>
+          <a:xfrm flipV="1">
+            <a:off x="2910882" y="1769100"/>
+            <a:ext cx="721661" cy="4021"/>
           </a:xfrm>
           <a:prstGeom prst="straightConnector1">
             <a:avLst/>
@@ -10985,8 +10970,8 @@
           <p:nvPr/>
         </p:nvSpPr>
         <p:spPr>
-          <a:xfrm>
-            <a:off x="3646951" y="1599940"/>
+          <a:xfrm rot="337656">
+            <a:off x="3627563" y="1731924"/>
             <a:ext cx="2066523" cy="276999"/>
           </a:xfrm>
           <a:prstGeom prst="rect">
@@ -11626,6 +11611,41 @@
             <a:r>
               <a:rPr lang="en-US" sz="1200" dirty="0"/>
               <a:t>Node</a:t>
+            </a:r>
+          </a:p>
+        </p:txBody>
+      </p:sp>
+      <p:sp>
+        <p:nvSpPr>
+          <p:cNvPr id="89" name="TextBox 88">
+            <a:extLst>
+              <a:ext uri="{FF2B5EF4-FFF2-40B4-BE49-F238E27FC236}">
+                <a16:creationId xmlns:a16="http://schemas.microsoft.com/office/drawing/2014/main" id="{9278175D-9C20-44F4-A73C-B92A0C088B73}"/>
+              </a:ext>
+            </a:extLst>
+          </p:cNvPr>
+          <p:cNvSpPr txBox="1"/>
+          <p:nvPr/>
+        </p:nvSpPr>
+        <p:spPr>
+          <a:xfrm>
+            <a:off x="5734369" y="2915750"/>
+            <a:ext cx="2919857" cy="276999"/>
+          </a:xfrm>
+          <a:prstGeom prst="rect">
+            <a:avLst/>
+          </a:prstGeom>
+          <a:noFill/>
+        </p:spPr>
+        <p:txBody>
+          <a:bodyPr wrap="square" rtlCol="0">
+            <a:spAutoFit/>
+          </a:bodyPr>
+          <a:lstStyle/>
+          <a:p>
+            <a:r>
+              <a:rPr lang="en-US" sz="1200" dirty="0"/>
+              <a:t>[ITI-103] Get Authorization Server Metadata</a:t>
             </a:r>
           </a:p>
         </p:txBody>
@@ -12383,7 +12403,7 @@
                   </a:schemeClr>
                 </a:solidFill>
               </a:rPr>
-              <a:t>PMIR Patient Identity Manager</a:t>
+              <a:t>PMIR Patient Identity Registry</a:t>
             </a:r>
           </a:p>
         </p:txBody>
@@ -14017,7 +14037,7 @@
           <a:p>
             <a:r>
               <a:rPr lang="en-US" sz="1400" b="1" dirty="0"/>
-              <a:t>PMIR Patient Identity Manager</a:t>
+              <a:t>PMIR Patient Identity Registry</a:t>
             </a:r>
           </a:p>
         </p:txBody>
@@ -14414,15 +14434,7 @@
           <a:p>
             <a:r>
               <a:rPr lang="en-US" sz="1200" dirty="0"/>
-              <a:t>[ITI-67] Find Document </a:t>
-            </a:r>
-            <a:r>
-              <a:rPr lang="en-US" sz="1200" dirty="0" err="1"/>
-              <a:t>Referemces</a:t>
-            </a:r>
-            <a:r>
-              <a:rPr lang="en-US" sz="1200" dirty="0"/>
-              <a:t> (with Patient ID)</a:t>
+              <a:t>[ITI-67] Find Document References (with Patient ID)</a:t>
             </a:r>
           </a:p>
         </p:txBody>
@@ -16940,7 +16952,7 @@
           <p:spPr>
             <a:xfrm>
               <a:off x="5045946" y="2278510"/>
-              <a:ext cx="2104623" cy="523220"/>
+              <a:ext cx="2104623" cy="500326"/>
             </a:xfrm>
             <a:prstGeom prst="rect">
               <a:avLst/>
@@ -16961,7 +16973,7 @@
             <a:p>
               <a:r>
                 <a:rPr lang="en-US" sz="1400" b="1" dirty="0"/>
-                <a:t>PMIR Patient Identity Manager</a:t>
+                <a:t>PMIR Patient Identity Registry</a:t>
               </a:r>
             </a:p>
           </p:txBody>
@@ -17730,7 +17742,7 @@
         </p:nvSpPr>
         <p:spPr>
           <a:xfrm>
-            <a:off x="4741191" y="902146"/>
+            <a:off x="4741191" y="717084"/>
             <a:ext cx="2610652" cy="3977656"/>
           </a:xfrm>
           <a:prstGeom prst="roundRect">
@@ -17790,7 +17802,7 @@
         </p:nvSpPr>
         <p:spPr>
           <a:xfrm>
-            <a:off x="5062738" y="3828073"/>
+            <a:off x="5062738" y="3643011"/>
             <a:ext cx="2066523" cy="523220"/>
           </a:xfrm>
           <a:prstGeom prst="rect">
@@ -17831,7 +17843,7 @@
         </p:nvSpPr>
         <p:spPr>
           <a:xfrm>
-            <a:off x="5062738" y="4479251"/>
+            <a:off x="5062738" y="4294189"/>
             <a:ext cx="2066523" cy="307777"/>
           </a:xfrm>
           <a:prstGeom prst="rect">
@@ -17878,7 +17890,7 @@
         </p:nvSpPr>
         <p:spPr>
           <a:xfrm>
-            <a:off x="5054252" y="3202551"/>
+            <a:off x="5054252" y="3017489"/>
             <a:ext cx="2104623" cy="523220"/>
           </a:xfrm>
           <a:prstGeom prst="rect">
@@ -17935,7 +17947,7 @@
         </p:nvSpPr>
         <p:spPr>
           <a:xfrm>
-            <a:off x="5031878" y="2039354"/>
+            <a:off x="5031878" y="1854292"/>
             <a:ext cx="2104623" cy="523220"/>
           </a:xfrm>
           <a:prstGeom prst="rect">
@@ -17963,7 +17975,7 @@
                   </a:schemeClr>
                 </a:solidFill>
               </a:rPr>
-              <a:t>PMIR Patient Identity Manager</a:t>
+              <a:t>PMIR Patient Identity Registry</a:t>
             </a:r>
           </a:p>
         </p:txBody>
@@ -17982,7 +17994,7 @@
         </p:nvSpPr>
         <p:spPr>
           <a:xfrm>
-            <a:off x="5054252" y="2750359"/>
+            <a:off x="5054252" y="2565297"/>
             <a:ext cx="2066523" cy="307777"/>
           </a:xfrm>
           <a:prstGeom prst="rect">
@@ -18029,7 +18041,7 @@
         </p:nvSpPr>
         <p:spPr>
           <a:xfrm>
-            <a:off x="2015834" y="5667899"/>
+            <a:off x="2015834" y="5308661"/>
             <a:ext cx="3373867" cy="276999"/>
           </a:xfrm>
           <a:prstGeom prst="rect">
@@ -18064,7 +18076,7 @@
         </p:nvSpPr>
         <p:spPr>
           <a:xfrm>
-            <a:off x="5072312" y="1400148"/>
+            <a:off x="5072312" y="1215086"/>
             <a:ext cx="2104623" cy="523220"/>
           </a:xfrm>
           <a:prstGeom prst="rect">
@@ -18111,7 +18123,7 @@
         </p:nvSpPr>
         <p:spPr>
           <a:xfrm>
-            <a:off x="4741192" y="1030167"/>
+            <a:off x="4741192" y="845105"/>
             <a:ext cx="2610651" cy="369332"/>
           </a:xfrm>
           <a:prstGeom prst="rect">
@@ -18148,8 +18160,8 @@
         </p:nvCxnSpPr>
         <p:spPr>
           <a:xfrm>
-            <a:off x="5936343" y="5102942"/>
-            <a:ext cx="0" cy="1755058"/>
+            <a:off x="5911767" y="4694740"/>
+            <a:ext cx="0" cy="2172928"/>
           </a:xfrm>
           <a:prstGeom prst="line">
             <a:avLst/>
@@ -18336,7 +18348,7 @@
         </p:nvCxnSpPr>
         <p:spPr>
           <a:xfrm>
-            <a:off x="1838561" y="5642498"/>
+            <a:off x="1838561" y="5326804"/>
             <a:ext cx="8337605" cy="0"/>
           </a:xfrm>
           <a:prstGeom prst="straightConnector1">
@@ -18381,7 +18393,7 @@
         </p:nvCxnSpPr>
         <p:spPr>
           <a:xfrm>
-            <a:off x="1838561" y="5970084"/>
+            <a:off x="1838561" y="5567302"/>
             <a:ext cx="8362636" cy="0"/>
           </a:xfrm>
           <a:prstGeom prst="straightConnector1">
@@ -18426,7 +18438,7 @@
         </p:nvCxnSpPr>
         <p:spPr>
           <a:xfrm>
-            <a:off x="1855467" y="6217846"/>
+            <a:off x="1855467" y="6239618"/>
             <a:ext cx="8333464" cy="0"/>
           </a:xfrm>
           <a:prstGeom prst="straightConnector1">
@@ -18469,7 +18481,7 @@
         </p:nvSpPr>
         <p:spPr>
           <a:xfrm>
-            <a:off x="2059056" y="5361464"/>
+            <a:off x="2059056" y="5089314"/>
             <a:ext cx="2610652" cy="276999"/>
           </a:xfrm>
           <a:prstGeom prst="rect">
@@ -18504,7 +18516,7 @@
         </p:nvSpPr>
         <p:spPr>
           <a:xfrm>
-            <a:off x="2037117" y="5949799"/>
+            <a:off x="2037117" y="6004229"/>
             <a:ext cx="2610652" cy="276999"/>
           </a:xfrm>
           <a:prstGeom prst="rect">
@@ -18619,7 +18631,7 @@
         </p:nvCxnSpPr>
         <p:spPr>
           <a:xfrm>
-            <a:off x="1854860" y="5008978"/>
+            <a:off x="1802413" y="5971090"/>
             <a:ext cx="4056907" cy="0"/>
           </a:xfrm>
           <a:prstGeom prst="straightConnector1">
@@ -18662,8 +18674,8 @@
         </p:nvSpPr>
         <p:spPr>
           <a:xfrm>
-            <a:off x="2490978" y="4597329"/>
-            <a:ext cx="1284597" cy="461665"/>
+            <a:off x="2204895" y="5664162"/>
+            <a:ext cx="2247265" cy="276999"/>
           </a:xfrm>
           <a:prstGeom prst="rect">
             <a:avLst/>
@@ -18686,13 +18698,7 @@
           <a:p>
             <a:r>
               <a:rPr lang="en-US" sz="1200" i="1" dirty="0"/>
-              <a:t>Patient Discovery </a:t>
-            </a:r>
-          </a:p>
-          <a:p>
-            <a:r>
-              <a:rPr lang="en-US" sz="1200" i="1" dirty="0"/>
-              <a:t>Process Flow</a:t>
+              <a:t>Patient Discovery Process Flow</a:t>
             </a:r>
           </a:p>
         </p:txBody>
@@ -18713,8 +18719,8 @@
         </p:nvCxnSpPr>
         <p:spPr>
           <a:xfrm>
-            <a:off x="1854860" y="5342247"/>
-            <a:ext cx="8362636" cy="0"/>
+            <a:off x="1854860" y="5070097"/>
+            <a:ext cx="8321306" cy="33331"/>
           </a:xfrm>
           <a:prstGeom prst="straightConnector1">
             <a:avLst/>
@@ -18756,7 +18762,7 @@
         </p:nvSpPr>
         <p:spPr>
           <a:xfrm>
-            <a:off x="2064737" y="5098579"/>
+            <a:off x="2064737" y="4826429"/>
             <a:ext cx="2610652" cy="276999"/>
           </a:xfrm>
           <a:prstGeom prst="rect">
@@ -19946,6 +19952,86 @@
           </a:p>
         </p:txBody>
       </p:sp>
+      <p:cxnSp>
+        <p:nvCxnSpPr>
+          <p:cNvPr id="62" name="Straight Arrow Connector 61">
+            <a:extLst>
+              <a:ext uri="{FF2B5EF4-FFF2-40B4-BE49-F238E27FC236}">
+                <a16:creationId xmlns:a16="http://schemas.microsoft.com/office/drawing/2014/main" id="{D867734D-A432-4500-A891-1FD9660E9F4E}"/>
+              </a:ext>
+            </a:extLst>
+          </p:cNvPr>
+          <p:cNvCxnSpPr>
+            <a:cxnSpLocks/>
+          </p:cNvCxnSpPr>
+          <p:nvPr/>
+        </p:nvCxnSpPr>
+        <p:spPr>
+          <a:xfrm>
+            <a:off x="1836571" y="4835722"/>
+            <a:ext cx="8321306" cy="33331"/>
+          </a:xfrm>
+          <a:prstGeom prst="straightConnector1">
+            <a:avLst/>
+          </a:prstGeom>
+          <a:ln>
+            <a:solidFill>
+              <a:schemeClr val="tx1"/>
+            </a:solidFill>
+            <a:prstDash val="sysDash"/>
+            <a:tailEnd type="triangle" w="lg" len="med"/>
+          </a:ln>
+        </p:spPr>
+        <p:style>
+          <a:lnRef idx="1">
+            <a:schemeClr val="accent1"/>
+          </a:lnRef>
+          <a:fillRef idx="0">
+            <a:schemeClr val="accent1"/>
+          </a:fillRef>
+          <a:effectRef idx="0">
+            <a:schemeClr val="accent1"/>
+          </a:effectRef>
+          <a:fontRef idx="minor">
+            <a:schemeClr val="tx1"/>
+          </a:fontRef>
+        </p:style>
+      </p:cxnSp>
+      <p:sp>
+        <p:nvSpPr>
+          <p:cNvPr id="76" name="TextBox 75">
+            <a:extLst>
+              <a:ext uri="{FF2B5EF4-FFF2-40B4-BE49-F238E27FC236}">
+                <a16:creationId xmlns:a16="http://schemas.microsoft.com/office/drawing/2014/main" id="{FE3FBF84-2D26-4A9B-B889-FBF5CE7BADD8}"/>
+              </a:ext>
+            </a:extLst>
+          </p:cNvPr>
+          <p:cNvSpPr txBox="1"/>
+          <p:nvPr/>
+        </p:nvSpPr>
+        <p:spPr>
+          <a:xfrm>
+            <a:off x="2046448" y="4592054"/>
+            <a:ext cx="3002534" cy="276999"/>
+          </a:xfrm>
+          <a:prstGeom prst="rect">
+            <a:avLst/>
+          </a:prstGeom>
+          <a:noFill/>
+        </p:spPr>
+        <p:txBody>
+          <a:bodyPr wrap="square" rtlCol="0">
+            <a:spAutoFit/>
+          </a:bodyPr>
+          <a:lstStyle/>
+          <a:p>
+            <a:r>
+              <a:rPr lang="en-US" sz="1200" dirty="0"/>
+              <a:t>[ITI-103] Get Authorization Server Metadata</a:t>
+            </a:r>
+          </a:p>
+        </p:txBody>
+      </p:sp>
     </p:spTree>
     <p:extLst>
       <p:ext uri="{BB962C8B-B14F-4D97-AF65-F5344CB8AC3E}">
@@ -19990,7 +20076,7 @@
         </p:nvSpPr>
         <p:spPr>
           <a:xfrm>
-            <a:off x="4741191" y="1113166"/>
+            <a:off x="4615223" y="898554"/>
             <a:ext cx="2610652" cy="3977656"/>
           </a:xfrm>
           <a:prstGeom prst="roundRect">
@@ -20050,7 +20136,7 @@
         </p:nvSpPr>
         <p:spPr>
           <a:xfrm>
-            <a:off x="5062738" y="4039093"/>
+            <a:off x="4936770" y="3824481"/>
             <a:ext cx="2066523" cy="523220"/>
           </a:xfrm>
           <a:prstGeom prst="rect">
@@ -20091,7 +20177,7 @@
         </p:nvSpPr>
         <p:spPr>
           <a:xfrm>
-            <a:off x="5062738" y="4690271"/>
+            <a:off x="4936770" y="4475659"/>
             <a:ext cx="2066523" cy="307777"/>
           </a:xfrm>
           <a:prstGeom prst="rect">
@@ -20138,7 +20224,7 @@
         </p:nvSpPr>
         <p:spPr>
           <a:xfrm>
-            <a:off x="5054252" y="3413571"/>
+            <a:off x="4928284" y="3198959"/>
             <a:ext cx="2104623" cy="523220"/>
           </a:xfrm>
           <a:prstGeom prst="rect">
@@ -20195,7 +20281,7 @@
         </p:nvSpPr>
         <p:spPr>
           <a:xfrm>
-            <a:off x="5069978" y="2250374"/>
+            <a:off x="4944010" y="2035762"/>
             <a:ext cx="2066523" cy="523220"/>
           </a:xfrm>
           <a:prstGeom prst="rect">
@@ -20223,7 +20309,7 @@
                   </a:schemeClr>
                 </a:solidFill>
               </a:rPr>
-              <a:t>PMIR Patient Identity Manager</a:t>
+              <a:t>PMIR Patient Identity Registry</a:t>
             </a:r>
           </a:p>
         </p:txBody>
@@ -20242,7 +20328,7 @@
         </p:nvSpPr>
         <p:spPr>
           <a:xfrm>
-            <a:off x="5054252" y="2961379"/>
+            <a:off x="4928284" y="2746767"/>
             <a:ext cx="2066523" cy="307777"/>
           </a:xfrm>
           <a:prstGeom prst="rect">
@@ -20289,7 +20375,7 @@
         </p:nvSpPr>
         <p:spPr>
           <a:xfrm>
-            <a:off x="2072106" y="5508793"/>
+            <a:off x="2072106" y="5541451"/>
             <a:ext cx="3373867" cy="276999"/>
           </a:xfrm>
           <a:prstGeom prst="rect">
@@ -20324,7 +20410,7 @@
         </p:nvSpPr>
         <p:spPr>
           <a:xfrm>
-            <a:off x="5072312" y="1611168"/>
+            <a:off x="4946344" y="1396556"/>
             <a:ext cx="2104623" cy="523220"/>
           </a:xfrm>
           <a:prstGeom prst="rect">
@@ -20371,7 +20457,7 @@
         </p:nvSpPr>
         <p:spPr>
           <a:xfrm>
-            <a:off x="4741192" y="1241187"/>
+            <a:off x="4615224" y="1026575"/>
             <a:ext cx="2610651" cy="369332"/>
           </a:xfrm>
           <a:prstGeom prst="rect">
@@ -20403,13 +20489,14 @@
           </p:cNvPr>
           <p:cNvCxnSpPr>
             <a:cxnSpLocks/>
+            <a:stCxn id="112" idx="2"/>
           </p:cNvCxnSpPr>
           <p:nvPr/>
         </p:nvCxnSpPr>
         <p:spPr>
-          <a:xfrm>
-            <a:off x="5936343" y="5102942"/>
-            <a:ext cx="0" cy="1755058"/>
+          <a:xfrm flipH="1">
+            <a:off x="5915521" y="4876210"/>
+            <a:ext cx="5028" cy="1926142"/>
           </a:xfrm>
           <a:prstGeom prst="line">
             <a:avLst/>
@@ -20453,8 +20540,8 @@
         </p:nvCxnSpPr>
         <p:spPr>
           <a:xfrm>
-            <a:off x="10201198" y="4488401"/>
-            <a:ext cx="13538" cy="2379267"/>
+            <a:off x="10201198" y="4423085"/>
+            <a:ext cx="9341" cy="2477784"/>
           </a:xfrm>
           <a:prstGeom prst="line">
             <a:avLst/>
@@ -20729,7 +20816,7 @@
         </p:nvSpPr>
         <p:spPr>
           <a:xfrm>
-            <a:off x="2059056" y="5230496"/>
+            <a:off x="2059056" y="5252268"/>
             <a:ext cx="2610652" cy="276999"/>
           </a:xfrm>
           <a:prstGeom prst="rect">
@@ -20846,7 +20933,7 @@
         </p:nvCxnSpPr>
         <p:spPr>
           <a:xfrm>
-            <a:off x="1854860" y="5211279"/>
+            <a:off x="1854860" y="5233051"/>
             <a:ext cx="8321306" cy="33331"/>
           </a:xfrm>
           <a:prstGeom prst="straightConnector1">
@@ -20889,7 +20976,7 @@
         </p:nvSpPr>
         <p:spPr>
           <a:xfrm>
-            <a:off x="2064737" y="4967611"/>
+            <a:off x="2064737" y="4989383"/>
             <a:ext cx="2610652" cy="276999"/>
           </a:xfrm>
           <a:prstGeom prst="rect">
@@ -20924,7 +21011,7 @@
         </p:nvSpPr>
         <p:spPr>
           <a:xfrm>
-            <a:off x="8575901" y="948971"/>
+            <a:off x="8575901" y="883655"/>
             <a:ext cx="3250593" cy="3539430"/>
           </a:xfrm>
           <a:prstGeom prst="rect">
@@ -21025,7 +21112,7 @@
         </p:nvSpPr>
         <p:spPr>
           <a:xfrm>
-            <a:off x="8771082" y="1347190"/>
+            <a:off x="8771082" y="1281874"/>
             <a:ext cx="2891969" cy="307777"/>
           </a:xfrm>
           <a:prstGeom prst="rect">
@@ -21065,7 +21152,7 @@
         </p:nvSpPr>
         <p:spPr>
           <a:xfrm>
-            <a:off x="8771082" y="1657603"/>
+            <a:off x="8771082" y="1592287"/>
             <a:ext cx="2891969" cy="307777"/>
           </a:xfrm>
           <a:prstGeom prst="rect">
@@ -21111,7 +21198,7 @@
         </p:nvSpPr>
         <p:spPr>
           <a:xfrm>
-            <a:off x="8771082" y="2602534"/>
+            <a:off x="8771082" y="2537218"/>
             <a:ext cx="2891969" cy="307777"/>
           </a:xfrm>
           <a:prstGeom prst="rect">
@@ -21157,7 +21244,7 @@
         </p:nvSpPr>
         <p:spPr>
           <a:xfrm>
-            <a:off x="8771082" y="3740114"/>
+            <a:off x="8771082" y="3674798"/>
             <a:ext cx="2891969" cy="307777"/>
           </a:xfrm>
           <a:prstGeom prst="rect">
@@ -21205,7 +21292,7 @@
         </p:nvSpPr>
         <p:spPr>
           <a:xfrm>
-            <a:off x="8771082" y="4064416"/>
+            <a:off x="8771082" y="3999100"/>
             <a:ext cx="2891969" cy="307777"/>
           </a:xfrm>
           <a:prstGeom prst="rect">
@@ -21251,7 +21338,7 @@
         </p:nvSpPr>
         <p:spPr>
           <a:xfrm>
-            <a:off x="8771082" y="3230980"/>
+            <a:off x="8771082" y="3165664"/>
             <a:ext cx="2891969" cy="523220"/>
           </a:xfrm>
           <a:prstGeom prst="rect">
@@ -21307,7 +21394,7 @@
         </p:nvSpPr>
         <p:spPr>
           <a:xfrm>
-            <a:off x="8771082" y="2924915"/>
+            <a:off x="8771082" y="2859599"/>
             <a:ext cx="2891969" cy="307777"/>
           </a:xfrm>
           <a:prstGeom prst="rect">
@@ -21353,7 +21440,7 @@
         </p:nvSpPr>
         <p:spPr>
           <a:xfrm>
-            <a:off x="8771082" y="2275297"/>
+            <a:off x="8771082" y="2209981"/>
             <a:ext cx="2891968" cy="307777"/>
           </a:xfrm>
           <a:prstGeom prst="rect">
@@ -21394,7 +21481,7 @@
         </p:nvSpPr>
         <p:spPr>
           <a:xfrm>
-            <a:off x="8771082" y="1970493"/>
+            <a:off x="8771082" y="1905177"/>
             <a:ext cx="2891968" cy="307777"/>
           </a:xfrm>
           <a:prstGeom prst="rect">
@@ -21435,7 +21522,7 @@
         </p:nvGrpSpPr>
         <p:grpSpPr>
           <a:xfrm>
-            <a:off x="364605" y="959186"/>
+            <a:off x="364605" y="893870"/>
             <a:ext cx="3212517" cy="3413006"/>
             <a:chOff x="359886" y="1152202"/>
             <a:chExt cx="2955696" cy="3081571"/>
@@ -22188,6 +22275,86 @@
             <a:r>
               <a:rPr lang="en-US" sz="1200" dirty="0"/>
               <a:t>Respond with  “403 Forbidden” (response is based on policy)</a:t>
+            </a:r>
+          </a:p>
+        </p:txBody>
+      </p:sp>
+      <p:cxnSp>
+        <p:nvCxnSpPr>
+          <p:cNvPr id="51" name="Straight Arrow Connector 50">
+            <a:extLst>
+              <a:ext uri="{FF2B5EF4-FFF2-40B4-BE49-F238E27FC236}">
+                <a16:creationId xmlns:a16="http://schemas.microsoft.com/office/drawing/2014/main" id="{D8014D9B-EEAD-45EB-8200-DC9D7FF44CA2}"/>
+              </a:ext>
+            </a:extLst>
+          </p:cNvPr>
+          <p:cNvCxnSpPr>
+            <a:cxnSpLocks/>
+          </p:cNvCxnSpPr>
+          <p:nvPr/>
+        </p:nvCxnSpPr>
+        <p:spPr>
+          <a:xfrm>
+            <a:off x="1836571" y="4999012"/>
+            <a:ext cx="8321306" cy="33331"/>
+          </a:xfrm>
+          <a:prstGeom prst="straightConnector1">
+            <a:avLst/>
+          </a:prstGeom>
+          <a:ln>
+            <a:solidFill>
+              <a:schemeClr val="tx1"/>
+            </a:solidFill>
+            <a:prstDash val="sysDash"/>
+            <a:tailEnd type="triangle" w="lg" len="med"/>
+          </a:ln>
+        </p:spPr>
+        <p:style>
+          <a:lnRef idx="1">
+            <a:schemeClr val="accent1"/>
+          </a:lnRef>
+          <a:fillRef idx="0">
+            <a:schemeClr val="accent1"/>
+          </a:fillRef>
+          <a:effectRef idx="0">
+            <a:schemeClr val="accent1"/>
+          </a:effectRef>
+          <a:fontRef idx="minor">
+            <a:schemeClr val="tx1"/>
+          </a:fontRef>
+        </p:style>
+      </p:cxnSp>
+      <p:sp>
+        <p:nvSpPr>
+          <p:cNvPr id="62" name="TextBox 61">
+            <a:extLst>
+              <a:ext uri="{FF2B5EF4-FFF2-40B4-BE49-F238E27FC236}">
+                <a16:creationId xmlns:a16="http://schemas.microsoft.com/office/drawing/2014/main" id="{35E1BF08-D2F9-4DE5-BAD9-59FD37195FC7}"/>
+              </a:ext>
+            </a:extLst>
+          </p:cNvPr>
+          <p:cNvSpPr txBox="1"/>
+          <p:nvPr/>
+        </p:nvSpPr>
+        <p:spPr>
+          <a:xfrm>
+            <a:off x="2046448" y="4755344"/>
+            <a:ext cx="3002534" cy="276999"/>
+          </a:xfrm>
+          <a:prstGeom prst="rect">
+            <a:avLst/>
+          </a:prstGeom>
+          <a:noFill/>
+        </p:spPr>
+        <p:txBody>
+          <a:bodyPr wrap="square" rtlCol="0">
+            <a:spAutoFit/>
+          </a:bodyPr>
+          <a:lstStyle/>
+          <a:p>
+            <a:r>
+              <a:rPr lang="en-US" sz="1200" dirty="0"/>
+              <a:t>[ITI-103] Get Authorization Server Metadata</a:t>
             </a:r>
           </a:p>
         </p:txBody>

</xml_diff>

<commit_message>
Figure 1-1 to use Document Registry from other figures for consistency
</commit_message>
<xml_diff>
--- a/input/images-source/Diagrams.pptx
+++ b/input/images-source/Diagrams.pptx
@@ -207,7 +207,7 @@
           <a:p>
             <a:fld id="{24638846-F7C5-49A2-B978-3CCBF149BEE6}" type="datetimeFigureOut">
               <a:rPr lang="en-US" smtClean="0"/>
-              <a:t>12/17/2021</a:t>
+              <a:t>12/22/2021</a:t>
             </a:fld>
             <a:endParaRPr lang="en-US"/>
           </a:p>
@@ -705,7 +705,7 @@
           <a:p>
             <a:fld id="{03431FED-738C-45FE-8DA9-95C611B1D2F8}" type="datetimeFigureOut">
               <a:rPr lang="en-US" smtClean="0"/>
-              <a:t>12/17/2021</a:t>
+              <a:t>12/22/2021</a:t>
             </a:fld>
             <a:endParaRPr lang="en-US"/>
           </a:p>
@@ -903,7 +903,7 @@
           <a:p>
             <a:fld id="{03431FED-738C-45FE-8DA9-95C611B1D2F8}" type="datetimeFigureOut">
               <a:rPr lang="en-US" smtClean="0"/>
-              <a:t>12/17/2021</a:t>
+              <a:t>12/22/2021</a:t>
             </a:fld>
             <a:endParaRPr lang="en-US"/>
           </a:p>
@@ -1111,7 +1111,7 @@
           <a:p>
             <a:fld id="{03431FED-738C-45FE-8DA9-95C611B1D2F8}" type="datetimeFigureOut">
               <a:rPr lang="en-US" smtClean="0"/>
-              <a:t>12/17/2021</a:t>
+              <a:t>12/22/2021</a:t>
             </a:fld>
             <a:endParaRPr lang="en-US"/>
           </a:p>
@@ -1392,7 +1392,7 @@
           <a:p>
             <a:fld id="{BFF328E6-E46B-6E40-8B27-5B2DDCCC311D}" type="datetime1">
               <a:rPr lang="en-US" smtClean="0"/>
-              <a:t>12/17/2021</a:t>
+              <a:t>12/22/2021</a:t>
             </a:fld>
             <a:endParaRPr lang="en-US" dirty="0"/>
           </a:p>
@@ -2014,7 +2014,7 @@
           <a:p>
             <a:fld id="{03431FED-738C-45FE-8DA9-95C611B1D2F8}" type="datetimeFigureOut">
               <a:rPr lang="en-US" smtClean="0"/>
-              <a:t>12/17/2021</a:t>
+              <a:t>12/22/2021</a:t>
             </a:fld>
             <a:endParaRPr lang="en-US"/>
           </a:p>
@@ -2289,7 +2289,7 @@
           <a:p>
             <a:fld id="{03431FED-738C-45FE-8DA9-95C611B1D2F8}" type="datetimeFigureOut">
               <a:rPr lang="en-US" smtClean="0"/>
-              <a:t>12/17/2021</a:t>
+              <a:t>12/22/2021</a:t>
             </a:fld>
             <a:endParaRPr lang="en-US"/>
           </a:p>
@@ -2554,7 +2554,7 @@
           <a:p>
             <a:fld id="{03431FED-738C-45FE-8DA9-95C611B1D2F8}" type="datetimeFigureOut">
               <a:rPr lang="en-US" smtClean="0"/>
-              <a:t>12/17/2021</a:t>
+              <a:t>12/22/2021</a:t>
             </a:fld>
             <a:endParaRPr lang="en-US"/>
           </a:p>
@@ -2966,7 +2966,7 @@
           <a:p>
             <a:fld id="{03431FED-738C-45FE-8DA9-95C611B1D2F8}" type="datetimeFigureOut">
               <a:rPr lang="en-US" smtClean="0"/>
-              <a:t>12/17/2021</a:t>
+              <a:t>12/22/2021</a:t>
             </a:fld>
             <a:endParaRPr lang="en-US"/>
           </a:p>
@@ -3107,7 +3107,7 @@
           <a:p>
             <a:fld id="{03431FED-738C-45FE-8DA9-95C611B1D2F8}" type="datetimeFigureOut">
               <a:rPr lang="en-US" smtClean="0"/>
-              <a:t>12/17/2021</a:t>
+              <a:t>12/22/2021</a:t>
             </a:fld>
             <a:endParaRPr lang="en-US"/>
           </a:p>
@@ -3220,7 +3220,7 @@
           <a:p>
             <a:fld id="{03431FED-738C-45FE-8DA9-95C611B1D2F8}" type="datetimeFigureOut">
               <a:rPr lang="en-US" smtClean="0"/>
-              <a:t>12/17/2021</a:t>
+              <a:t>12/22/2021</a:t>
             </a:fld>
             <a:endParaRPr lang="en-US"/>
           </a:p>
@@ -3531,7 +3531,7 @@
           <a:p>
             <a:fld id="{03431FED-738C-45FE-8DA9-95C611B1D2F8}" type="datetimeFigureOut">
               <a:rPr lang="en-US" smtClean="0"/>
-              <a:t>12/17/2021</a:t>
+              <a:t>12/22/2021</a:t>
             </a:fld>
             <a:endParaRPr lang="en-US"/>
           </a:p>
@@ -3819,7 +3819,7 @@
           <a:p>
             <a:fld id="{03431FED-738C-45FE-8DA9-95C611B1D2F8}" type="datetimeFigureOut">
               <a:rPr lang="en-US" smtClean="0"/>
-              <a:t>12/17/2021</a:t>
+              <a:t>12/22/2021</a:t>
             </a:fld>
             <a:endParaRPr lang="en-US"/>
           </a:p>
@@ -4060,7 +4060,7 @@
           <a:p>
             <a:fld id="{03431FED-738C-45FE-8DA9-95C611B1D2F8}" type="datetimeFigureOut">
               <a:rPr lang="en-US" smtClean="0"/>
-              <a:t>12/17/2021</a:t>
+              <a:t>12/22/2021</a:t>
             </a:fld>
             <a:endParaRPr lang="en-US"/>
           </a:p>
@@ -7641,10 +7641,10 @@
       </p:grpSpPr>
       <p:sp>
         <p:nvSpPr>
-          <p:cNvPr id="2" name="TextBox 1">
-            <a:extLst>
-              <a:ext uri="{FF2B5EF4-FFF2-40B4-BE49-F238E27FC236}">
-                <a16:creationId xmlns:a16="http://schemas.microsoft.com/office/drawing/2014/main" id="{B3B74D0E-9F8C-4D01-A702-575813AD357C}"/>
+          <p:cNvPr id="14" name="TextBox 13">
+            <a:extLst>
+              <a:ext uri="{FF2B5EF4-FFF2-40B4-BE49-F238E27FC236}">
+                <a16:creationId xmlns:a16="http://schemas.microsoft.com/office/drawing/2014/main" id="{96F1C608-823E-4943-9F48-47211D2216E4}"/>
               </a:ext>
             </a:extLst>
           </p:cNvPr>
@@ -7653,14 +7653,14 @@
         </p:nvSpPr>
         <p:spPr>
           <a:xfrm>
-            <a:off x="1203960" y="701040"/>
-            <a:ext cx="9616439" cy="523220"/>
+            <a:off x="551574" y="426455"/>
+            <a:ext cx="6931577" cy="6217920"/>
           </a:xfrm>
           <a:prstGeom prst="rect">
             <a:avLst/>
           </a:prstGeom>
           <a:noFill/>
-          <a:ln>
+          <a:ln w="12700">
             <a:solidFill>
               <a:schemeClr val="tx1"/>
             </a:solidFill>
@@ -7674,18 +7674,74 @@
           <a:p>
             <a:pPr algn="ctr"/>
             <a:r>
-              <a:rPr lang="en-US" sz="2800" dirty="0"/>
-              <a:t>Document Registry</a:t>
-            </a:r>
-          </a:p>
-        </p:txBody>
-      </p:sp>
-      <p:sp>
-        <p:nvSpPr>
-          <p:cNvPr id="3" name="TextBox 2">
-            <a:extLst>
-              <a:ext uri="{FF2B5EF4-FFF2-40B4-BE49-F238E27FC236}">
-                <a16:creationId xmlns:a16="http://schemas.microsoft.com/office/drawing/2014/main" id="{8EEF598D-03B4-43DB-A683-85BB6D59BFD5}"/>
+              <a:rPr lang="en-US" sz="3200" b="1" dirty="0"/>
+              <a:t>MHDS Document Registry</a:t>
+            </a:r>
+          </a:p>
+          <a:p>
+            <a:pPr algn="ctr"/>
+            <a:endParaRPr lang="en-US" sz="3200" b="1" dirty="0"/>
+          </a:p>
+          <a:p>
+            <a:pPr algn="ctr"/>
+            <a:endParaRPr lang="en-US" sz="2400" b="1" dirty="0"/>
+          </a:p>
+          <a:p>
+            <a:pPr algn="ctr"/>
+            <a:endParaRPr lang="en-US" sz="2400" b="1" dirty="0"/>
+          </a:p>
+          <a:p>
+            <a:pPr algn="ctr"/>
+            <a:endParaRPr lang="en-US" sz="2400" b="1" dirty="0"/>
+          </a:p>
+          <a:p>
+            <a:pPr algn="ctr"/>
+            <a:endParaRPr lang="en-US" sz="2400" b="1" dirty="0"/>
+          </a:p>
+          <a:p>
+            <a:pPr algn="ctr"/>
+            <a:endParaRPr lang="en-US" sz="2400" b="1" dirty="0"/>
+          </a:p>
+          <a:p>
+            <a:pPr algn="ctr"/>
+            <a:endParaRPr lang="en-US" sz="2400" b="1" dirty="0"/>
+          </a:p>
+          <a:p>
+            <a:pPr algn="ctr"/>
+            <a:endParaRPr lang="en-US" sz="2400" b="1" dirty="0"/>
+          </a:p>
+          <a:p>
+            <a:pPr algn="ctr"/>
+            <a:endParaRPr lang="en-US" sz="2400" b="1" dirty="0"/>
+          </a:p>
+          <a:p>
+            <a:pPr algn="ctr"/>
+            <a:endParaRPr lang="en-US" sz="2400" b="1" dirty="0"/>
+          </a:p>
+          <a:p>
+            <a:pPr algn="ctr"/>
+            <a:endParaRPr lang="en-US" sz="2400" b="1" dirty="0"/>
+          </a:p>
+          <a:p>
+            <a:pPr algn="ctr"/>
+            <a:endParaRPr lang="en-US" sz="2400" b="1" dirty="0"/>
+          </a:p>
+          <a:p>
+            <a:pPr algn="ctr"/>
+            <a:endParaRPr lang="en-US" sz="2400" b="1" dirty="0"/>
+          </a:p>
+          <a:p>
+            <a:pPr algn="ctr"/>
+            <a:endParaRPr lang="en-US" sz="2400" b="1" dirty="0"/>
+          </a:p>
+        </p:txBody>
+      </p:sp>
+      <p:sp>
+        <p:nvSpPr>
+          <p:cNvPr id="16" name="TextBox 15">
+            <a:extLst>
+              <a:ext uri="{FF2B5EF4-FFF2-40B4-BE49-F238E27FC236}">
+                <a16:creationId xmlns:a16="http://schemas.microsoft.com/office/drawing/2014/main" id="{8548214C-B62E-4619-B796-4F0A6041FAAB}"/>
               </a:ext>
             </a:extLst>
           </p:cNvPr>
@@ -7693,19 +7749,18 @@
           <p:nvPr/>
         </p:nvSpPr>
         <p:spPr>
-          <a:xfrm rot="16200000">
-            <a:off x="83257" y="3292944"/>
-            <a:ext cx="5109188" cy="954107"/>
+          <a:xfrm>
+            <a:off x="907781" y="1242788"/>
+            <a:ext cx="6166846" cy="517553"/>
           </a:xfrm>
           <a:prstGeom prst="rect">
             <a:avLst/>
           </a:prstGeom>
           <a:noFill/>
-          <a:ln>
+          <a:ln w="12700">
             <a:solidFill>
               <a:schemeClr val="tx1"/>
             </a:solidFill>
-            <a:prstDash val="dash"/>
           </a:ln>
         </p:spPr>
         <p:txBody>
@@ -7715,21 +7770,18 @@
           <a:lstStyle/>
           <a:p>
             <a:r>
-              <a:rPr lang="en-US" sz="2800" dirty="0"/>
-              <a:t>MHD – Document Recipient</a:t>
-            </a:r>
-          </a:p>
-          <a:p>
-            <a:endParaRPr lang="en-US" sz="2800" dirty="0"/>
-          </a:p>
-        </p:txBody>
-      </p:sp>
-      <p:sp>
-        <p:nvSpPr>
-          <p:cNvPr id="4" name="TextBox 3">
-            <a:extLst>
-              <a:ext uri="{FF2B5EF4-FFF2-40B4-BE49-F238E27FC236}">
-                <a16:creationId xmlns:a16="http://schemas.microsoft.com/office/drawing/2014/main" id="{2B459278-75F4-4F74-ACB7-3FE74480D270}"/>
+              <a:rPr lang="en-US" sz="2400" b="1" dirty="0"/>
+              <a:t>MHD Document Responder</a:t>
+            </a:r>
+          </a:p>
+        </p:txBody>
+      </p:sp>
+      <p:sp>
+        <p:nvSpPr>
+          <p:cNvPr id="17" name="TextBox 16">
+            <a:extLst>
+              <a:ext uri="{FF2B5EF4-FFF2-40B4-BE49-F238E27FC236}">
+                <a16:creationId xmlns:a16="http://schemas.microsoft.com/office/drawing/2014/main" id="{D7920E36-E6D6-4233-B1D5-AE1E6096D566}"/>
               </a:ext>
             </a:extLst>
           </p:cNvPr>
@@ -7737,19 +7789,18 @@
           <p:nvPr/>
         </p:nvSpPr>
         <p:spPr>
-          <a:xfrm rot="16200000">
-            <a:off x="-848251" y="3292942"/>
-            <a:ext cx="5109188" cy="954107"/>
+          <a:xfrm>
+            <a:off x="907781" y="1798775"/>
+            <a:ext cx="6166846" cy="517553"/>
           </a:xfrm>
           <a:prstGeom prst="rect">
             <a:avLst/>
           </a:prstGeom>
           <a:noFill/>
-          <a:ln>
+          <a:ln w="12700">
             <a:solidFill>
               <a:schemeClr val="tx1"/>
             </a:solidFill>
-            <a:prstDash val="dash"/>
           </a:ln>
         </p:spPr>
         <p:txBody>
@@ -7759,21 +7810,18 @@
           <a:lstStyle/>
           <a:p>
             <a:r>
-              <a:rPr lang="en-US" sz="2800" dirty="0"/>
-              <a:t>MHD - Document Responder</a:t>
-            </a:r>
-          </a:p>
-          <a:p>
-            <a:endParaRPr lang="en-US" sz="2800" dirty="0"/>
-          </a:p>
-        </p:txBody>
-      </p:sp>
-      <p:sp>
-        <p:nvSpPr>
-          <p:cNvPr id="5" name="TextBox 4">
-            <a:extLst>
-              <a:ext uri="{FF2B5EF4-FFF2-40B4-BE49-F238E27FC236}">
-                <a16:creationId xmlns:a16="http://schemas.microsoft.com/office/drawing/2014/main" id="{A4638DCF-8A49-4A27-A052-FAA8E62F07A7}"/>
+              <a:rPr lang="en-US" sz="2400" b="1" dirty="0"/>
+              <a:t>MHD Document Recipient</a:t>
+            </a:r>
+          </a:p>
+        </p:txBody>
+      </p:sp>
+      <p:sp>
+        <p:nvSpPr>
+          <p:cNvPr id="18" name="TextBox 17">
+            <a:extLst>
+              <a:ext uri="{FF2B5EF4-FFF2-40B4-BE49-F238E27FC236}">
+                <a16:creationId xmlns:a16="http://schemas.microsoft.com/office/drawing/2014/main" id="{AB9106BA-6F1E-437A-AAB2-F1853F61D101}"/>
               </a:ext>
             </a:extLst>
           </p:cNvPr>
@@ -7781,19 +7829,18 @@
           <p:nvPr/>
         </p:nvSpPr>
         <p:spPr>
-          <a:xfrm rot="16200000">
-            <a:off x="1046470" y="3292949"/>
-            <a:ext cx="5109189" cy="954107"/>
+          <a:xfrm>
+            <a:off x="907781" y="3495370"/>
+            <a:ext cx="6166846" cy="517553"/>
           </a:xfrm>
           <a:prstGeom prst="rect">
             <a:avLst/>
           </a:prstGeom>
           <a:noFill/>
-          <a:ln>
+          <a:ln w="12700">
             <a:solidFill>
               <a:schemeClr val="tx1"/>
             </a:solidFill>
-            <a:prstDash val="dash"/>
           </a:ln>
         </p:spPr>
         <p:txBody>
@@ -7803,21 +7850,18 @@
           <a:lstStyle/>
           <a:p>
             <a:r>
-              <a:rPr lang="en-US" sz="2800" dirty="0"/>
-              <a:t>PMIR – Patient Identity Consumer</a:t>
-            </a:r>
-          </a:p>
-          <a:p>
-            <a:endParaRPr lang="en-US" sz="2800" dirty="0"/>
-          </a:p>
-        </p:txBody>
-      </p:sp>
-      <p:sp>
-        <p:nvSpPr>
-          <p:cNvPr id="9" name="TextBox 8">
-            <a:extLst>
-              <a:ext uri="{FF2B5EF4-FFF2-40B4-BE49-F238E27FC236}">
-                <a16:creationId xmlns:a16="http://schemas.microsoft.com/office/drawing/2014/main" id="{8A026634-4802-403D-9F06-9C38995B6973}"/>
+              <a:rPr lang="en-US" sz="2400" b="1" dirty="0"/>
+              <a:t>PMIR Patient Identity Consumer</a:t>
+            </a:r>
+          </a:p>
+        </p:txBody>
+      </p:sp>
+      <p:sp>
+        <p:nvSpPr>
+          <p:cNvPr id="19" name="TextBox 18">
+            <a:extLst>
+              <a:ext uri="{FF2B5EF4-FFF2-40B4-BE49-F238E27FC236}">
+                <a16:creationId xmlns:a16="http://schemas.microsoft.com/office/drawing/2014/main" id="{47CBA7E2-1C28-44B0-BD93-515C871305E3}"/>
               </a:ext>
             </a:extLst>
           </p:cNvPr>
@@ -7825,40 +7869,46 @@
           <p:nvPr/>
         </p:nvSpPr>
         <p:spPr>
-          <a:xfrm rot="16200000">
-            <a:off x="5491161" y="3292941"/>
-            <a:ext cx="5109188" cy="954106"/>
+          <a:xfrm>
+            <a:off x="907779" y="5162595"/>
+            <a:ext cx="6166846" cy="461665"/>
           </a:xfrm>
           <a:prstGeom prst="rect">
             <a:avLst/>
           </a:prstGeom>
           <a:noFill/>
-          <a:ln>
+          <a:ln w="12700">
             <a:solidFill>
               <a:schemeClr val="tx1"/>
             </a:solidFill>
-            <a:prstDash val="dash"/>
           </a:ln>
         </p:spPr>
         <p:txBody>
           <a:bodyPr wrap="square" rtlCol="0">
             <a:spAutoFit/>
           </a:bodyPr>
-          <a:lstStyle/>
-          <a:p>
-            <a:r>
-              <a:rPr lang="en-US" sz="2800" dirty="0"/>
-              <a:t>mCSD – Care Services Selective Consumer</a:t>
-            </a:r>
-          </a:p>
-        </p:txBody>
-      </p:sp>
-      <p:sp>
-        <p:nvSpPr>
-          <p:cNvPr id="10" name="TextBox 9">
-            <a:extLst>
-              <a:ext uri="{FF2B5EF4-FFF2-40B4-BE49-F238E27FC236}">
-                <a16:creationId xmlns:a16="http://schemas.microsoft.com/office/drawing/2014/main" id="{6C3FD147-258E-4824-9FF8-DAD599887FCC}"/>
+          <a:lstStyle>
+            <a:defPPr>
+              <a:defRPr lang="en-US"/>
+            </a:defPPr>
+            <a:lvl1pPr>
+              <a:defRPr sz="2400" b="1"/>
+            </a:lvl1pPr>
+          </a:lstStyle>
+          <a:p>
+            <a:r>
+              <a:rPr lang="en-US" dirty="0"/>
+              <a:t>ATNA Secure Node</a:t>
+            </a:r>
+          </a:p>
+        </p:txBody>
+      </p:sp>
+      <p:sp>
+        <p:nvSpPr>
+          <p:cNvPr id="20" name="TextBox 19">
+            <a:extLst>
+              <a:ext uri="{FF2B5EF4-FFF2-40B4-BE49-F238E27FC236}">
+                <a16:creationId xmlns:a16="http://schemas.microsoft.com/office/drawing/2014/main" id="{B7883BBF-9F41-4070-895F-2AD387C9CB76}"/>
               </a:ext>
             </a:extLst>
           </p:cNvPr>
@@ -7866,43 +7916,46 @@
           <p:nvPr/>
         </p:nvSpPr>
         <p:spPr>
-          <a:xfrm rot="16200000">
-            <a:off x="4161938" y="3292935"/>
-            <a:ext cx="5109188" cy="954107"/>
+          <a:xfrm>
+            <a:off x="907779" y="5681481"/>
+            <a:ext cx="6166846" cy="461665"/>
           </a:xfrm>
           <a:prstGeom prst="rect">
             <a:avLst/>
           </a:prstGeom>
           <a:noFill/>
-          <a:ln>
+          <a:ln w="12700">
             <a:solidFill>
               <a:schemeClr val="tx1"/>
             </a:solidFill>
-            <a:prstDash val="dash"/>
           </a:ln>
         </p:spPr>
         <p:txBody>
           <a:bodyPr wrap="square" rtlCol="0">
             <a:spAutoFit/>
           </a:bodyPr>
-          <a:lstStyle/>
-          <a:p>
-            <a:r>
-              <a:rPr lang="en-US" sz="2800" dirty="0"/>
-              <a:t>SVCM – Consumer</a:t>
-            </a:r>
-          </a:p>
-          <a:p>
-            <a:endParaRPr lang="en-US" sz="2800" dirty="0"/>
-          </a:p>
-        </p:txBody>
-      </p:sp>
-      <p:sp>
-        <p:nvSpPr>
-          <p:cNvPr id="11" name="TextBox 10">
-            <a:extLst>
-              <a:ext uri="{FF2B5EF4-FFF2-40B4-BE49-F238E27FC236}">
-                <a16:creationId xmlns:a16="http://schemas.microsoft.com/office/drawing/2014/main" id="{F5231B80-9F70-4245-9E56-0D96B0BF2199}"/>
+          <a:lstStyle>
+            <a:defPPr>
+              <a:defRPr lang="en-US"/>
+            </a:defPPr>
+            <a:lvl1pPr>
+              <a:defRPr sz="2400" b="1"/>
+            </a:lvl1pPr>
+          </a:lstStyle>
+          <a:p>
+            <a:r>
+              <a:rPr lang="en-US" dirty="0"/>
+              <a:t>CT Time Client</a:t>
+            </a:r>
+          </a:p>
+        </p:txBody>
+      </p:sp>
+      <p:sp>
+        <p:nvSpPr>
+          <p:cNvPr id="21" name="TextBox 20">
+            <a:extLst>
+              <a:ext uri="{FF2B5EF4-FFF2-40B4-BE49-F238E27FC236}">
+                <a16:creationId xmlns:a16="http://schemas.microsoft.com/office/drawing/2014/main" id="{DB06BF5A-0926-4A36-9BBD-6B99FD5627A4}"/>
               </a:ext>
             </a:extLst>
           </p:cNvPr>
@@ -7910,43 +7963,50 @@
           <p:nvPr/>
         </p:nvSpPr>
         <p:spPr>
-          <a:xfrm rot="16200000">
-            <a:off x="6809869" y="3292932"/>
-            <a:ext cx="5109188" cy="954107"/>
+          <a:xfrm>
+            <a:off x="907781" y="4638187"/>
+            <a:ext cx="6166846" cy="461665"/>
           </a:xfrm>
           <a:prstGeom prst="rect">
             <a:avLst/>
           </a:prstGeom>
           <a:noFill/>
-          <a:ln>
+          <a:ln w="12700">
             <a:solidFill>
               <a:schemeClr val="tx1"/>
             </a:solidFill>
-            <a:prstDash val="dash"/>
           </a:ln>
         </p:spPr>
         <p:txBody>
           <a:bodyPr wrap="square" rtlCol="0">
             <a:spAutoFit/>
           </a:bodyPr>
-          <a:lstStyle/>
-          <a:p>
-            <a:r>
-              <a:rPr lang="en-US" sz="2800" dirty="0"/>
-              <a:t>IUA – Resource Server</a:t>
-            </a:r>
-          </a:p>
-          <a:p>
-            <a:endParaRPr lang="en-US" sz="2800" dirty="0"/>
-          </a:p>
-        </p:txBody>
-      </p:sp>
-      <p:sp>
-        <p:nvSpPr>
-          <p:cNvPr id="12" name="TextBox 11">
-            <a:extLst>
-              <a:ext uri="{FF2B5EF4-FFF2-40B4-BE49-F238E27FC236}">
-                <a16:creationId xmlns:a16="http://schemas.microsoft.com/office/drawing/2014/main" id="{948442AE-8E69-4C32-B147-FAA08C3FFC05}"/>
+          <a:lstStyle>
+            <a:defPPr>
+              <a:defRPr lang="en-US"/>
+            </a:defPPr>
+            <a:lvl1pPr>
+              <a:defRPr sz="2400" b="1"/>
+            </a:lvl1pPr>
+          </a:lstStyle>
+          <a:p>
+            <a:r>
+              <a:rPr lang="en-US" dirty="0" err="1"/>
+              <a:t>mCSD</a:t>
+            </a:r>
+            <a:r>
+              <a:rPr lang="en-US" dirty="0"/>
+              <a:t> Care Services Selective Consumer</a:t>
+            </a:r>
+          </a:p>
+        </p:txBody>
+      </p:sp>
+      <p:sp>
+        <p:nvSpPr>
+          <p:cNvPr id="22" name="TextBox 21">
+            <a:extLst>
+              <a:ext uri="{FF2B5EF4-FFF2-40B4-BE49-F238E27FC236}">
+                <a16:creationId xmlns:a16="http://schemas.microsoft.com/office/drawing/2014/main" id="{EDFF4CBF-0F81-4341-AE6F-B9A2EAE92EDD}"/>
               </a:ext>
             </a:extLst>
           </p:cNvPr>
@@ -7954,19 +8014,18 @@
           <p:nvPr/>
         </p:nvSpPr>
         <p:spPr>
-          <a:xfrm rot="16200000">
-            <a:off x="2027074" y="3292942"/>
-            <a:ext cx="5109188" cy="954107"/>
+          <a:xfrm>
+            <a:off x="907781" y="4066308"/>
+            <a:ext cx="6166846" cy="517553"/>
           </a:xfrm>
           <a:prstGeom prst="rect">
             <a:avLst/>
           </a:prstGeom>
           <a:noFill/>
-          <a:ln>
+          <a:ln w="12700">
             <a:solidFill>
               <a:schemeClr val="tx1"/>
             </a:solidFill>
-            <a:prstDash val="dash"/>
           </a:ln>
         </p:spPr>
         <p:txBody>
@@ -7976,21 +8035,18 @@
           <a:lstStyle/>
           <a:p>
             <a:r>
-              <a:rPr lang="en-US" sz="2800" dirty="0"/>
-              <a:t>ATNA – Secure Node</a:t>
-            </a:r>
-          </a:p>
-          <a:p>
-            <a:endParaRPr lang="en-US" sz="2800" dirty="0"/>
-          </a:p>
-        </p:txBody>
-      </p:sp>
-      <p:sp>
-        <p:nvSpPr>
-          <p:cNvPr id="13" name="TextBox 12">
-            <a:extLst>
-              <a:ext uri="{FF2B5EF4-FFF2-40B4-BE49-F238E27FC236}">
-                <a16:creationId xmlns:a16="http://schemas.microsoft.com/office/drawing/2014/main" id="{0008983A-E537-4C95-A179-B538D0C94EFE}"/>
+              <a:rPr lang="en-US" sz="2400" b="1" dirty="0"/>
+              <a:t>SVCM Terminology Consumer</a:t>
+            </a:r>
+          </a:p>
+        </p:txBody>
+      </p:sp>
+      <p:sp>
+        <p:nvSpPr>
+          <p:cNvPr id="23" name="TextBox 22">
+            <a:extLst>
+              <a:ext uri="{FF2B5EF4-FFF2-40B4-BE49-F238E27FC236}">
+                <a16:creationId xmlns:a16="http://schemas.microsoft.com/office/drawing/2014/main" id="{56FC3CF5-7140-41EC-9CC7-BD1DFF7C1996}"/>
               </a:ext>
             </a:extLst>
           </p:cNvPr>
@@ -7998,19 +8054,19 @@
           <p:nvPr/>
         </p:nvSpPr>
         <p:spPr>
-          <a:xfrm rot="16200000">
-            <a:off x="3002147" y="3292940"/>
-            <a:ext cx="5109188" cy="954107"/>
+          <a:xfrm>
+            <a:off x="907780" y="2925819"/>
+            <a:ext cx="6166846" cy="517553"/>
           </a:xfrm>
           <a:prstGeom prst="rect">
             <a:avLst/>
           </a:prstGeom>
           <a:noFill/>
-          <a:ln>
+          <a:ln w="12700">
             <a:solidFill>
               <a:schemeClr val="tx1"/>
             </a:solidFill>
-            <a:prstDash val="dash"/>
+            <a:prstDash val="solid"/>
           </a:ln>
         </p:spPr>
         <p:txBody>
@@ -8020,21 +8076,18 @@
           <a:lstStyle/>
           <a:p>
             <a:r>
-              <a:rPr lang="en-US" sz="2800" dirty="0"/>
-              <a:t>CT – Time Client</a:t>
-            </a:r>
-          </a:p>
-          <a:p>
-            <a:endParaRPr lang="en-US" sz="2800" dirty="0"/>
-          </a:p>
-        </p:txBody>
-      </p:sp>
-      <p:sp>
-        <p:nvSpPr>
-          <p:cNvPr id="15" name="TextBox 14">
-            <a:extLst>
-              <a:ext uri="{FF2B5EF4-FFF2-40B4-BE49-F238E27FC236}">
-                <a16:creationId xmlns:a16="http://schemas.microsoft.com/office/drawing/2014/main" id="{05F167F6-00BE-4E1C-89A8-E6B33FDF3154}"/>
+              <a:rPr lang="en-US" sz="2400" b="1" dirty="0"/>
+              <a:t>IUA Resource Server</a:t>
+            </a:r>
+          </a:p>
+        </p:txBody>
+      </p:sp>
+      <p:sp>
+        <p:nvSpPr>
+          <p:cNvPr id="24" name="TextBox 23">
+            <a:extLst>
+              <a:ext uri="{FF2B5EF4-FFF2-40B4-BE49-F238E27FC236}">
+                <a16:creationId xmlns:a16="http://schemas.microsoft.com/office/drawing/2014/main" id="{BE18AD96-F5F0-4D90-A661-BF6316479235}"/>
               </a:ext>
             </a:extLst>
           </p:cNvPr>
@@ -8042,19 +8095,19 @@
           <p:nvPr/>
         </p:nvSpPr>
         <p:spPr>
-          <a:xfrm rot="16200000">
-            <a:off x="7785969" y="3292932"/>
-            <a:ext cx="5109188" cy="954107"/>
+          <a:xfrm>
+            <a:off x="907781" y="2359392"/>
+            <a:ext cx="6166844" cy="517553"/>
           </a:xfrm>
           <a:prstGeom prst="rect">
             <a:avLst/>
           </a:prstGeom>
           <a:noFill/>
-          <a:ln>
+          <a:ln w="12700">
             <a:solidFill>
               <a:schemeClr val="tx1"/>
             </a:solidFill>
-            <a:prstDash val="dash"/>
+            <a:prstDash val="solid"/>
           </a:ln>
         </p:spPr>
         <p:txBody>
@@ -8064,12 +8117,9 @@
           <a:lstStyle/>
           <a:p>
             <a:r>
-              <a:rPr lang="en-US" sz="2800" dirty="0"/>
-              <a:t>IUA – Authorization Service</a:t>
-            </a:r>
-          </a:p>
-          <a:p>
-            <a:endParaRPr lang="en-US" sz="2800" dirty="0"/>
+              <a:rPr lang="en-US" sz="2400" b="1" dirty="0"/>
+              <a:t>IUA Authorization Server</a:t>
+            </a:r>
           </a:p>
         </p:txBody>
       </p:sp>

</xml_diff>

<commit_message>
put IUA with security like the description has
</commit_message>
<xml_diff>
--- a/input/images-source/Diagrams.pptx
+++ b/input/images-source/Diagrams.pptx
@@ -7750,7 +7750,7 @@
         </p:nvSpPr>
         <p:spPr>
           <a:xfrm>
-            <a:off x="907781" y="1242788"/>
+            <a:off x="907781" y="1233263"/>
             <a:ext cx="6166846" cy="517553"/>
           </a:xfrm>
           <a:prstGeom prst="rect">
@@ -7830,7 +7830,7 @@
         </p:nvSpPr>
         <p:spPr>
           <a:xfrm>
-            <a:off x="907781" y="3495370"/>
+            <a:off x="907781" y="2371420"/>
             <a:ext cx="6166846" cy="517553"/>
           </a:xfrm>
           <a:prstGeom prst="rect">
@@ -7964,7 +7964,7 @@
         </p:nvSpPr>
         <p:spPr>
           <a:xfrm>
-            <a:off x="907781" y="4638187"/>
+            <a:off x="907781" y="3514237"/>
             <a:ext cx="6166846" cy="461665"/>
           </a:xfrm>
           <a:prstGeom prst="rect">
@@ -8015,7 +8015,7 @@
         </p:nvSpPr>
         <p:spPr>
           <a:xfrm>
-            <a:off x="907781" y="4066308"/>
+            <a:off x="907781" y="2942358"/>
             <a:ext cx="6166846" cy="517553"/>
           </a:xfrm>
           <a:prstGeom prst="rect">
@@ -8055,7 +8055,7 @@
         </p:nvSpPr>
         <p:spPr>
           <a:xfrm>
-            <a:off x="907780" y="2925819"/>
+            <a:off x="907779" y="4589950"/>
             <a:ext cx="6166846" cy="517553"/>
           </a:xfrm>
           <a:prstGeom prst="rect">
@@ -8096,7 +8096,7 @@
         </p:nvSpPr>
         <p:spPr>
           <a:xfrm>
-            <a:off x="907781" y="2359392"/>
+            <a:off x="907780" y="4023523"/>
             <a:ext cx="6166844" cy="517553"/>
           </a:xfrm>
           <a:prstGeom prst="rect">

</xml_diff>